<commit_message>
DeleteSequenceDiagram.pptx: Adjust arrow positions
</commit_message>
<xml_diff>
--- a/docs/diagrams/DeleteSequenceDiagram.pptx
+++ b/docs/diagrams/DeleteSequenceDiagram.pptx
@@ -208,7 +208,7 @@
           <a:p>
             <a:fld id="{F5CC4B3F-88C1-4FFA-B1B6-F41C21DC6924}" type="datetimeFigureOut">
               <a:rPr lang="en-US" smtClean="0"/>
-              <a:t>10/29/18</a:t>
+              <a:t>11/10/18</a:t>
             </a:fld>
             <a:endParaRPr lang="en-US"/>
           </a:p>
@@ -738,7 +738,7 @@
           <a:p>
             <a:fld id="{78C97017-6FC3-485B-9764-EAC9E56C1D49}" type="datetimeFigureOut">
               <a:rPr lang="en-US" smtClean="0"/>
-              <a:t>10/29/18</a:t>
+              <a:t>11/10/18</a:t>
             </a:fld>
             <a:endParaRPr lang="en-US"/>
           </a:p>
@@ -906,7 +906,7 @@
           <a:p>
             <a:fld id="{78C97017-6FC3-485B-9764-EAC9E56C1D49}" type="datetimeFigureOut">
               <a:rPr lang="en-US" smtClean="0"/>
-              <a:t>10/29/18</a:t>
+              <a:t>11/10/18</a:t>
             </a:fld>
             <a:endParaRPr lang="en-US"/>
           </a:p>
@@ -1084,7 +1084,7 @@
           <a:p>
             <a:fld id="{78C97017-6FC3-485B-9764-EAC9E56C1D49}" type="datetimeFigureOut">
               <a:rPr lang="en-US" smtClean="0"/>
-              <a:t>10/29/18</a:t>
+              <a:t>11/10/18</a:t>
             </a:fld>
             <a:endParaRPr lang="en-US"/>
           </a:p>
@@ -1252,7 +1252,7 @@
           <a:p>
             <a:fld id="{78C97017-6FC3-485B-9764-EAC9E56C1D49}" type="datetimeFigureOut">
               <a:rPr lang="en-US" smtClean="0"/>
-              <a:t>10/29/18</a:t>
+              <a:t>11/10/18</a:t>
             </a:fld>
             <a:endParaRPr lang="en-US"/>
           </a:p>
@@ -1497,7 +1497,7 @@
           <a:p>
             <a:fld id="{78C97017-6FC3-485B-9764-EAC9E56C1D49}" type="datetimeFigureOut">
               <a:rPr lang="en-US" smtClean="0"/>
-              <a:t>10/29/18</a:t>
+              <a:t>11/10/18</a:t>
             </a:fld>
             <a:endParaRPr lang="en-US"/>
           </a:p>
@@ -1782,7 +1782,7 @@
           <a:p>
             <a:fld id="{78C97017-6FC3-485B-9764-EAC9E56C1D49}" type="datetimeFigureOut">
               <a:rPr lang="en-US" smtClean="0"/>
-              <a:t>10/29/18</a:t>
+              <a:t>11/10/18</a:t>
             </a:fld>
             <a:endParaRPr lang="en-US"/>
           </a:p>
@@ -2201,7 +2201,7 @@
           <a:p>
             <a:fld id="{78C97017-6FC3-485B-9764-EAC9E56C1D49}" type="datetimeFigureOut">
               <a:rPr lang="en-US" smtClean="0"/>
-              <a:t>10/29/18</a:t>
+              <a:t>11/10/18</a:t>
             </a:fld>
             <a:endParaRPr lang="en-US"/>
           </a:p>
@@ -2318,7 +2318,7 @@
           <a:p>
             <a:fld id="{78C97017-6FC3-485B-9764-EAC9E56C1D49}" type="datetimeFigureOut">
               <a:rPr lang="en-US" smtClean="0"/>
-              <a:t>10/29/18</a:t>
+              <a:t>11/10/18</a:t>
             </a:fld>
             <a:endParaRPr lang="en-US"/>
           </a:p>
@@ -2413,7 +2413,7 @@
           <a:p>
             <a:fld id="{78C97017-6FC3-485B-9764-EAC9E56C1D49}" type="datetimeFigureOut">
               <a:rPr lang="en-US" smtClean="0"/>
-              <a:t>10/29/18</a:t>
+              <a:t>11/10/18</a:t>
             </a:fld>
             <a:endParaRPr lang="en-US"/>
           </a:p>
@@ -2688,7 +2688,7 @@
           <a:p>
             <a:fld id="{78C97017-6FC3-485B-9764-EAC9E56C1D49}" type="datetimeFigureOut">
               <a:rPr lang="en-US" smtClean="0"/>
-              <a:t>10/29/18</a:t>
+              <a:t>11/10/18</a:t>
             </a:fld>
             <a:endParaRPr lang="en-US"/>
           </a:p>
@@ -2940,7 +2940,7 @@
           <a:p>
             <a:fld id="{78C97017-6FC3-485B-9764-EAC9E56C1D49}" type="datetimeFigureOut">
               <a:rPr lang="en-US" smtClean="0"/>
-              <a:t>10/29/18</a:t>
+              <a:t>11/10/18</a:t>
             </a:fld>
             <a:endParaRPr lang="en-US"/>
           </a:p>
@@ -3151,7 +3151,7 @@
           <a:p>
             <a:fld id="{78C97017-6FC3-485B-9764-EAC9E56C1D49}" type="datetimeFigureOut">
               <a:rPr lang="en-US" smtClean="0"/>
-              <a:t>10/29/18</a:t>
+              <a:t>11/10/18</a:t>
             </a:fld>
             <a:endParaRPr lang="en-US"/>
           </a:p>
@@ -5025,8 +5025,8 @@
         </p:nvCxnSpPr>
         <p:spPr>
           <a:xfrm flipV="1">
-            <a:off x="-370860" y="4633191"/>
-            <a:ext cx="4563689" cy="9715"/>
+            <a:off x="-370860" y="4639812"/>
+            <a:ext cx="4577871" cy="3095"/>
           </a:xfrm>
           <a:prstGeom prst="straightConnector1">
             <a:avLst/>
@@ -5859,13 +5859,12 @@
           </p:cNvPr>
           <p:cNvCxnSpPr>
             <a:cxnSpLocks/>
-            <a:endCxn id="59" idx="1"/>
           </p:cNvCxnSpPr>
           <p:nvPr/>
         </p:nvCxnSpPr>
         <p:spPr>
           <a:xfrm>
-            <a:off x="1759554" y="2459944"/>
+            <a:off x="1762803" y="2488629"/>
             <a:ext cx="524859" cy="2805"/>
           </a:xfrm>
           <a:prstGeom prst="straightConnector1">
@@ -6054,8 +6053,8 @@
         </p:nvCxnSpPr>
         <p:spPr>
           <a:xfrm>
-            <a:off x="1763356" y="3048000"/>
-            <a:ext cx="1379111" cy="0"/>
+            <a:off x="1748548" y="3024893"/>
+            <a:ext cx="1420136" cy="0"/>
           </a:xfrm>
           <a:prstGeom prst="straightConnector1">
             <a:avLst/>

</xml_diff>